<commit_message>
complete block 2 code
</commit_message>
<xml_diff>
--- a/slides/block2.pptx
+++ b/slides/block2.pptx
@@ -5,7 +5,7 @@
     <p:sldMasterId id="2147483648" r:id="rId1"/>
   </p:sldMasterIdLst>
   <p:notesMasterIdLst>
-    <p:notesMasterId r:id="rId8"/>
+    <p:notesMasterId r:id="rId9"/>
   </p:notesMasterIdLst>
   <p:sldIdLst>
     <p:sldId id="256" r:id="rId2"/>
@@ -14,6 +14,7 @@
     <p:sldId id="284" r:id="rId5"/>
     <p:sldId id="285" r:id="rId6"/>
     <p:sldId id="286" r:id="rId7"/>
+    <p:sldId id="287" r:id="rId8"/>
   </p:sldIdLst>
   <p:sldSz cx="12192000" cy="6858000"/>
   <p:notesSz cx="6858000" cy="9144000"/>
@@ -3811,15 +3812,7 @@
           <a:p>
             <a:r>
               <a:rPr lang="en-KW" dirty="0"/>
-              <a:t>Block 2</a:t>
-            </a:r>
-            <a:r>
-              <a:rPr lang="en-KW"/>
-              <a:t>: Univariate Linear </a:t>
-            </a:r>
-            <a:r>
-              <a:rPr lang="en-KW" dirty="0"/>
-              <a:t>Regression</a:t>
+              <a:t>Block 2: Univariate Linear Regression</a:t>
             </a:r>
           </a:p>
         </p:txBody>
@@ -5128,6 +5121,1594 @@
     <p:extLst>
       <p:ext uri="{BB962C8B-B14F-4D97-AF65-F5344CB8AC3E}">
         <p14:creationId xmlns:p14="http://schemas.microsoft.com/office/powerpoint/2010/main" val="3961307411"/>
+      </p:ext>
+    </p:extLst>
+  </p:cSld>
+  <p:clrMapOvr>
+    <a:masterClrMapping/>
+  </p:clrMapOvr>
+</p:sld>
+</file>
+
+<file path=ppt/slides/slide7.xml><?xml version="1.0" encoding="utf-8"?>
+<p:sld xmlns:a="http://schemas.openxmlformats.org/drawingml/2006/main" xmlns:r="http://schemas.openxmlformats.org/officeDocument/2006/relationships" xmlns:p="http://schemas.openxmlformats.org/presentationml/2006/main">
+  <p:cSld>
+    <p:spTree>
+      <p:nvGrpSpPr>
+        <p:cNvPr id="1" name=""/>
+        <p:cNvGrpSpPr/>
+        <p:nvPr/>
+      </p:nvGrpSpPr>
+      <p:grpSpPr>
+        <a:xfrm>
+          <a:off x="0" y="0"/>
+          <a:ext cx="0" cy="0"/>
+          <a:chOff x="0" y="0"/>
+          <a:chExt cx="0" cy="0"/>
+        </a:xfrm>
+      </p:grpSpPr>
+      <p:sp>
+        <p:nvSpPr>
+          <p:cNvPr id="2" name="Title 1">
+            <a:extLst>
+              <a:ext uri="{FF2B5EF4-FFF2-40B4-BE49-F238E27FC236}">
+                <a16:creationId xmlns:a16="http://schemas.microsoft.com/office/drawing/2014/main" id="{A590204F-68F1-5384-0576-35C72458D4DC}"/>
+              </a:ext>
+            </a:extLst>
+          </p:cNvPr>
+          <p:cNvSpPr>
+            <a:spLocks noGrp="1"/>
+          </p:cNvSpPr>
+          <p:nvPr>
+            <p:ph type="title"/>
+          </p:nvPr>
+        </p:nvSpPr>
+        <p:spPr/>
+        <p:txBody>
+          <a:bodyPr/>
+          <a:lstStyle/>
+          <a:p>
+            <a:r>
+              <a:rPr lang="en-KW"/>
+              <a:t>Flat to 2D Index</a:t>
+            </a:r>
+          </a:p>
+        </p:txBody>
+      </p:sp>
+      <p:sp>
+        <p:nvSpPr>
+          <p:cNvPr id="4" name="Rectangle 3">
+            <a:extLst>
+              <a:ext uri="{FF2B5EF4-FFF2-40B4-BE49-F238E27FC236}">
+                <a16:creationId xmlns:a16="http://schemas.microsoft.com/office/drawing/2014/main" id="{08ABD371-C97D-FCA2-B429-A998984BF04C}"/>
+              </a:ext>
+            </a:extLst>
+          </p:cNvPr>
+          <p:cNvSpPr/>
+          <p:nvPr/>
+        </p:nvSpPr>
+        <p:spPr>
+          <a:xfrm>
+            <a:off x="4215904" y="2846819"/>
+            <a:ext cx="893379" cy="893379"/>
+          </a:xfrm>
+          <a:prstGeom prst="rect">
+            <a:avLst/>
+          </a:prstGeom>
+          <a:noFill/>
+          <a:ln w="28575">
+            <a:solidFill>
+              <a:schemeClr val="tx1"/>
+            </a:solidFill>
+          </a:ln>
+        </p:spPr>
+        <p:style>
+          <a:lnRef idx="2">
+            <a:schemeClr val="accent1">
+              <a:shade val="15000"/>
+            </a:schemeClr>
+          </a:lnRef>
+          <a:fillRef idx="1">
+            <a:schemeClr val="accent1"/>
+          </a:fillRef>
+          <a:effectRef idx="0">
+            <a:schemeClr val="accent1"/>
+          </a:effectRef>
+          <a:fontRef idx="minor">
+            <a:schemeClr val="lt1"/>
+          </a:fontRef>
+        </p:style>
+        <p:txBody>
+          <a:bodyPr rtlCol="0" anchor="ctr"/>
+          <a:lstStyle/>
+          <a:p>
+            <a:pPr algn="ctr"/>
+            <a:r>
+              <a:rPr lang="en-KW" sz="3200" dirty="0">
+                <a:solidFill>
+                  <a:srgbClr val="FF0000"/>
+                </a:solidFill>
+              </a:rPr>
+              <a:t>0</a:t>
+            </a:r>
+          </a:p>
+          <a:p>
+            <a:pPr algn="ctr"/>
+            <a:r>
+              <a:rPr lang="en-KW" sz="1600" dirty="0">
+                <a:solidFill>
+                  <a:srgbClr val="FF0000"/>
+                </a:solidFill>
+              </a:rPr>
+              <a:t>(0,0)</a:t>
+            </a:r>
+          </a:p>
+        </p:txBody>
+      </p:sp>
+      <p:sp>
+        <p:nvSpPr>
+          <p:cNvPr id="5" name="Rectangle 4">
+            <a:extLst>
+              <a:ext uri="{FF2B5EF4-FFF2-40B4-BE49-F238E27FC236}">
+                <a16:creationId xmlns:a16="http://schemas.microsoft.com/office/drawing/2014/main" id="{1EF253E9-F33A-0077-773A-19D44C78D45D}"/>
+              </a:ext>
+            </a:extLst>
+          </p:cNvPr>
+          <p:cNvSpPr/>
+          <p:nvPr/>
+        </p:nvSpPr>
+        <p:spPr>
+          <a:xfrm>
+            <a:off x="5109283" y="2846819"/>
+            <a:ext cx="893379" cy="893379"/>
+          </a:xfrm>
+          <a:prstGeom prst="rect">
+            <a:avLst/>
+          </a:prstGeom>
+          <a:noFill/>
+          <a:ln w="28575">
+            <a:solidFill>
+              <a:schemeClr val="tx1"/>
+            </a:solidFill>
+          </a:ln>
+        </p:spPr>
+        <p:style>
+          <a:lnRef idx="2">
+            <a:schemeClr val="accent1">
+              <a:shade val="15000"/>
+            </a:schemeClr>
+          </a:lnRef>
+          <a:fillRef idx="1">
+            <a:schemeClr val="accent1"/>
+          </a:fillRef>
+          <a:effectRef idx="0">
+            <a:schemeClr val="accent1"/>
+          </a:effectRef>
+          <a:fontRef idx="minor">
+            <a:schemeClr val="lt1"/>
+          </a:fontRef>
+        </p:style>
+        <p:txBody>
+          <a:bodyPr rtlCol="0" anchor="ctr"/>
+          <a:lstStyle/>
+          <a:p>
+            <a:pPr algn="ctr"/>
+            <a:r>
+              <a:rPr lang="en-KW" sz="3200" dirty="0">
+                <a:solidFill>
+                  <a:srgbClr val="FF0000"/>
+                </a:solidFill>
+              </a:rPr>
+              <a:t>1</a:t>
+            </a:r>
+          </a:p>
+          <a:p>
+            <a:pPr marL="0" marR="0" lvl="0" indent="0" algn="ctr" defTabSz="914400" rtl="0" eaLnBrk="1" fontAlgn="auto" latinLnBrk="0" hangingPunct="1">
+              <a:lnSpc>
+                <a:spcPct val="100000"/>
+              </a:lnSpc>
+              <a:spcBef>
+                <a:spcPts val="0"/>
+              </a:spcBef>
+              <a:spcAft>
+                <a:spcPts val="0"/>
+              </a:spcAft>
+              <a:buClrTx/>
+              <a:buSzTx/>
+              <a:buFontTx/>
+              <a:buNone/>
+              <a:tabLst/>
+              <a:defRPr/>
+            </a:pPr>
+            <a:r>
+              <a:rPr kumimoji="0" lang="en-KW" sz="1600" b="0" i="0" u="none" strike="noStrike" kern="1200" cap="none" spc="0" normalizeH="0" baseline="0" noProof="0" dirty="0">
+                <a:ln>
+                  <a:noFill/>
+                </a:ln>
+                <a:solidFill>
+                  <a:srgbClr val="FF0000"/>
+                </a:solidFill>
+                <a:effectLst/>
+                <a:uLnTx/>
+                <a:uFillTx/>
+                <a:latin typeface="Aptos" panose="02110004020202020204"/>
+                <a:ea typeface="+mn-ea"/>
+                <a:cs typeface="+mn-cs"/>
+              </a:rPr>
+              <a:t>(0,1)</a:t>
+            </a:r>
+          </a:p>
+        </p:txBody>
+      </p:sp>
+      <p:sp>
+        <p:nvSpPr>
+          <p:cNvPr id="6" name="Rectangle 5">
+            <a:extLst>
+              <a:ext uri="{FF2B5EF4-FFF2-40B4-BE49-F238E27FC236}">
+                <a16:creationId xmlns:a16="http://schemas.microsoft.com/office/drawing/2014/main" id="{1BD670D7-C38D-A933-D160-835F7C143DF6}"/>
+              </a:ext>
+            </a:extLst>
+          </p:cNvPr>
+          <p:cNvSpPr/>
+          <p:nvPr/>
+        </p:nvSpPr>
+        <p:spPr>
+          <a:xfrm>
+            <a:off x="6002662" y="2846818"/>
+            <a:ext cx="893379" cy="893379"/>
+          </a:xfrm>
+          <a:prstGeom prst="rect">
+            <a:avLst/>
+          </a:prstGeom>
+          <a:noFill/>
+          <a:ln w="28575">
+            <a:solidFill>
+              <a:schemeClr val="tx1"/>
+            </a:solidFill>
+          </a:ln>
+        </p:spPr>
+        <p:style>
+          <a:lnRef idx="2">
+            <a:schemeClr val="accent1">
+              <a:shade val="15000"/>
+            </a:schemeClr>
+          </a:lnRef>
+          <a:fillRef idx="1">
+            <a:schemeClr val="accent1"/>
+          </a:fillRef>
+          <a:effectRef idx="0">
+            <a:schemeClr val="accent1"/>
+          </a:effectRef>
+          <a:fontRef idx="minor">
+            <a:schemeClr val="lt1"/>
+          </a:fontRef>
+        </p:style>
+        <p:txBody>
+          <a:bodyPr rtlCol="0" anchor="ctr"/>
+          <a:lstStyle/>
+          <a:p>
+            <a:pPr algn="ctr"/>
+            <a:r>
+              <a:rPr lang="en-KW" sz="3200" dirty="0">
+                <a:solidFill>
+                  <a:srgbClr val="FF0000"/>
+                </a:solidFill>
+              </a:rPr>
+              <a:t>2</a:t>
+            </a:r>
+          </a:p>
+          <a:p>
+            <a:pPr marL="0" marR="0" lvl="0" indent="0" algn="ctr" defTabSz="914400" rtl="0" eaLnBrk="1" fontAlgn="auto" latinLnBrk="0" hangingPunct="1">
+              <a:lnSpc>
+                <a:spcPct val="100000"/>
+              </a:lnSpc>
+              <a:spcBef>
+                <a:spcPts val="0"/>
+              </a:spcBef>
+              <a:spcAft>
+                <a:spcPts val="0"/>
+              </a:spcAft>
+              <a:buClrTx/>
+              <a:buSzTx/>
+              <a:buFontTx/>
+              <a:buNone/>
+              <a:tabLst/>
+              <a:defRPr/>
+            </a:pPr>
+            <a:r>
+              <a:rPr kumimoji="0" lang="en-KW" sz="1600" b="0" i="0" u="none" strike="noStrike" kern="1200" cap="none" spc="0" normalizeH="0" baseline="0" noProof="0" dirty="0">
+                <a:ln>
+                  <a:noFill/>
+                </a:ln>
+                <a:solidFill>
+                  <a:srgbClr val="FF0000"/>
+                </a:solidFill>
+                <a:effectLst/>
+                <a:uLnTx/>
+                <a:uFillTx/>
+                <a:latin typeface="Aptos" panose="02110004020202020204"/>
+                <a:ea typeface="+mn-ea"/>
+                <a:cs typeface="+mn-cs"/>
+              </a:rPr>
+              <a:t>(0,2)</a:t>
+            </a:r>
+          </a:p>
+        </p:txBody>
+      </p:sp>
+      <p:sp>
+        <p:nvSpPr>
+          <p:cNvPr id="7" name="Rectangle 6">
+            <a:extLst>
+              <a:ext uri="{FF2B5EF4-FFF2-40B4-BE49-F238E27FC236}">
+                <a16:creationId xmlns:a16="http://schemas.microsoft.com/office/drawing/2014/main" id="{3244C352-5C49-AE63-E332-1A0DB21055C7}"/>
+              </a:ext>
+            </a:extLst>
+          </p:cNvPr>
+          <p:cNvSpPr/>
+          <p:nvPr/>
+        </p:nvSpPr>
+        <p:spPr>
+          <a:xfrm>
+            <a:off x="6896041" y="2846817"/>
+            <a:ext cx="893379" cy="893379"/>
+          </a:xfrm>
+          <a:prstGeom prst="rect">
+            <a:avLst/>
+          </a:prstGeom>
+          <a:noFill/>
+          <a:ln w="28575">
+            <a:solidFill>
+              <a:schemeClr val="tx1"/>
+            </a:solidFill>
+          </a:ln>
+        </p:spPr>
+        <p:style>
+          <a:lnRef idx="2">
+            <a:schemeClr val="accent1">
+              <a:shade val="15000"/>
+            </a:schemeClr>
+          </a:lnRef>
+          <a:fillRef idx="1">
+            <a:schemeClr val="accent1"/>
+          </a:fillRef>
+          <a:effectRef idx="0">
+            <a:schemeClr val="accent1"/>
+          </a:effectRef>
+          <a:fontRef idx="minor">
+            <a:schemeClr val="lt1"/>
+          </a:fontRef>
+        </p:style>
+        <p:txBody>
+          <a:bodyPr rtlCol="0" anchor="ctr"/>
+          <a:lstStyle/>
+          <a:p>
+            <a:pPr marL="0" marR="0" lvl="0" indent="0" algn="ctr" defTabSz="914400" rtl="0" eaLnBrk="1" fontAlgn="auto" latinLnBrk="0" hangingPunct="1">
+              <a:lnSpc>
+                <a:spcPct val="100000"/>
+              </a:lnSpc>
+              <a:spcBef>
+                <a:spcPts val="0"/>
+              </a:spcBef>
+              <a:spcAft>
+                <a:spcPts val="0"/>
+              </a:spcAft>
+              <a:buClrTx/>
+              <a:buSzTx/>
+              <a:buFontTx/>
+              <a:buNone/>
+              <a:tabLst/>
+              <a:defRPr/>
+            </a:pPr>
+            <a:r>
+              <a:rPr lang="en-KW" sz="3200" dirty="0">
+                <a:solidFill>
+                  <a:srgbClr val="FF0000"/>
+                </a:solidFill>
+              </a:rPr>
+              <a:t>3</a:t>
+            </a:r>
+          </a:p>
+          <a:p>
+            <a:pPr marL="0" marR="0" lvl="0" indent="0" algn="ctr" defTabSz="914400" rtl="0" eaLnBrk="1" fontAlgn="auto" latinLnBrk="0" hangingPunct="1">
+              <a:lnSpc>
+                <a:spcPct val="100000"/>
+              </a:lnSpc>
+              <a:spcBef>
+                <a:spcPts val="0"/>
+              </a:spcBef>
+              <a:spcAft>
+                <a:spcPts val="0"/>
+              </a:spcAft>
+              <a:buClrTx/>
+              <a:buSzTx/>
+              <a:buFontTx/>
+              <a:buNone/>
+              <a:tabLst/>
+              <a:defRPr/>
+            </a:pPr>
+            <a:r>
+              <a:rPr kumimoji="0" lang="en-KW" sz="1600" b="0" i="0" u="none" strike="noStrike" kern="1200" cap="none" spc="0" normalizeH="0" baseline="0" noProof="0" dirty="0">
+                <a:ln>
+                  <a:noFill/>
+                </a:ln>
+                <a:solidFill>
+                  <a:srgbClr val="FF0000"/>
+                </a:solidFill>
+                <a:effectLst/>
+                <a:uLnTx/>
+                <a:uFillTx/>
+                <a:latin typeface="Aptos" panose="02110004020202020204"/>
+                <a:ea typeface="+mn-ea"/>
+                <a:cs typeface="+mn-cs"/>
+              </a:rPr>
+              <a:t>(0,3)</a:t>
+            </a:r>
+          </a:p>
+        </p:txBody>
+      </p:sp>
+      <p:sp>
+        <p:nvSpPr>
+          <p:cNvPr id="8" name="Rectangle 7">
+            <a:extLst>
+              <a:ext uri="{FF2B5EF4-FFF2-40B4-BE49-F238E27FC236}">
+                <a16:creationId xmlns:a16="http://schemas.microsoft.com/office/drawing/2014/main" id="{056E591F-03F1-5450-99B4-EDC4F46BE8F8}"/>
+              </a:ext>
+            </a:extLst>
+          </p:cNvPr>
+          <p:cNvSpPr/>
+          <p:nvPr/>
+        </p:nvSpPr>
+        <p:spPr>
+          <a:xfrm>
+            <a:off x="4215904" y="3740198"/>
+            <a:ext cx="893379" cy="893379"/>
+          </a:xfrm>
+          <a:prstGeom prst="rect">
+            <a:avLst/>
+          </a:prstGeom>
+          <a:noFill/>
+          <a:ln w="28575">
+            <a:solidFill>
+              <a:schemeClr val="tx1"/>
+            </a:solidFill>
+          </a:ln>
+        </p:spPr>
+        <p:style>
+          <a:lnRef idx="2">
+            <a:schemeClr val="accent1">
+              <a:shade val="15000"/>
+            </a:schemeClr>
+          </a:lnRef>
+          <a:fillRef idx="1">
+            <a:schemeClr val="accent1"/>
+          </a:fillRef>
+          <a:effectRef idx="0">
+            <a:schemeClr val="accent1"/>
+          </a:effectRef>
+          <a:fontRef idx="minor">
+            <a:schemeClr val="lt1"/>
+          </a:fontRef>
+        </p:style>
+        <p:txBody>
+          <a:bodyPr rtlCol="0" anchor="ctr"/>
+          <a:lstStyle/>
+          <a:p>
+            <a:pPr algn="ctr"/>
+            <a:r>
+              <a:rPr lang="en-KW" sz="3200" dirty="0">
+                <a:solidFill>
+                  <a:srgbClr val="FF0000"/>
+                </a:solidFill>
+              </a:rPr>
+              <a:t>4</a:t>
+            </a:r>
+          </a:p>
+          <a:p>
+            <a:pPr marL="0" marR="0" lvl="0" indent="0" algn="ctr" defTabSz="914400" rtl="0" eaLnBrk="1" fontAlgn="auto" latinLnBrk="0" hangingPunct="1">
+              <a:lnSpc>
+                <a:spcPct val="100000"/>
+              </a:lnSpc>
+              <a:spcBef>
+                <a:spcPts val="0"/>
+              </a:spcBef>
+              <a:spcAft>
+                <a:spcPts val="0"/>
+              </a:spcAft>
+              <a:buClrTx/>
+              <a:buSzTx/>
+              <a:buFontTx/>
+              <a:buNone/>
+              <a:tabLst/>
+              <a:defRPr/>
+            </a:pPr>
+            <a:r>
+              <a:rPr kumimoji="0" lang="en-KW" sz="1600" b="0" i="0" u="none" strike="noStrike" kern="1200" cap="none" spc="0" normalizeH="0" baseline="0" noProof="0" dirty="0">
+                <a:ln>
+                  <a:noFill/>
+                </a:ln>
+                <a:solidFill>
+                  <a:srgbClr val="FF0000"/>
+                </a:solidFill>
+                <a:effectLst/>
+                <a:uLnTx/>
+                <a:uFillTx/>
+                <a:latin typeface="Aptos" panose="02110004020202020204"/>
+                <a:ea typeface="+mn-ea"/>
+                <a:cs typeface="+mn-cs"/>
+              </a:rPr>
+              <a:t>(1,0)</a:t>
+            </a:r>
+          </a:p>
+        </p:txBody>
+      </p:sp>
+      <p:sp>
+        <p:nvSpPr>
+          <p:cNvPr id="9" name="Rectangle 8">
+            <a:extLst>
+              <a:ext uri="{FF2B5EF4-FFF2-40B4-BE49-F238E27FC236}">
+                <a16:creationId xmlns:a16="http://schemas.microsoft.com/office/drawing/2014/main" id="{0989CDED-08F7-7B77-9C73-EAAC2C0F693C}"/>
+              </a:ext>
+            </a:extLst>
+          </p:cNvPr>
+          <p:cNvSpPr/>
+          <p:nvPr/>
+        </p:nvSpPr>
+        <p:spPr>
+          <a:xfrm>
+            <a:off x="5109283" y="3740198"/>
+            <a:ext cx="893379" cy="893379"/>
+          </a:xfrm>
+          <a:prstGeom prst="rect">
+            <a:avLst/>
+          </a:prstGeom>
+          <a:noFill/>
+          <a:ln w="28575">
+            <a:solidFill>
+              <a:schemeClr val="tx1"/>
+            </a:solidFill>
+          </a:ln>
+        </p:spPr>
+        <p:style>
+          <a:lnRef idx="2">
+            <a:schemeClr val="accent1">
+              <a:shade val="15000"/>
+            </a:schemeClr>
+          </a:lnRef>
+          <a:fillRef idx="1">
+            <a:schemeClr val="accent1"/>
+          </a:fillRef>
+          <a:effectRef idx="0">
+            <a:schemeClr val="accent1"/>
+          </a:effectRef>
+          <a:fontRef idx="minor">
+            <a:schemeClr val="lt1"/>
+          </a:fontRef>
+        </p:style>
+        <p:txBody>
+          <a:bodyPr rtlCol="0" anchor="ctr"/>
+          <a:lstStyle/>
+          <a:p>
+            <a:pPr algn="ctr"/>
+            <a:r>
+              <a:rPr lang="en-KW" sz="3200" dirty="0">
+                <a:solidFill>
+                  <a:srgbClr val="FF0000"/>
+                </a:solidFill>
+              </a:rPr>
+              <a:t>5</a:t>
+            </a:r>
+          </a:p>
+          <a:p>
+            <a:pPr marL="0" marR="0" lvl="0" indent="0" algn="ctr" defTabSz="914400" rtl="0" eaLnBrk="1" fontAlgn="auto" latinLnBrk="0" hangingPunct="1">
+              <a:lnSpc>
+                <a:spcPct val="100000"/>
+              </a:lnSpc>
+              <a:spcBef>
+                <a:spcPts val="0"/>
+              </a:spcBef>
+              <a:spcAft>
+                <a:spcPts val="0"/>
+              </a:spcAft>
+              <a:buClrTx/>
+              <a:buSzTx/>
+              <a:buFontTx/>
+              <a:buNone/>
+              <a:tabLst/>
+              <a:defRPr/>
+            </a:pPr>
+            <a:r>
+              <a:rPr kumimoji="0" lang="en-KW" sz="1600" b="0" i="0" u="none" strike="noStrike" kern="1200" cap="none" spc="0" normalizeH="0" baseline="0" noProof="0" dirty="0">
+                <a:ln>
+                  <a:noFill/>
+                </a:ln>
+                <a:solidFill>
+                  <a:srgbClr val="FF0000"/>
+                </a:solidFill>
+                <a:effectLst/>
+                <a:uLnTx/>
+                <a:uFillTx/>
+                <a:latin typeface="Aptos" panose="02110004020202020204"/>
+                <a:ea typeface="+mn-ea"/>
+                <a:cs typeface="+mn-cs"/>
+              </a:rPr>
+              <a:t>(1,1)</a:t>
+            </a:r>
+          </a:p>
+        </p:txBody>
+      </p:sp>
+      <p:sp>
+        <p:nvSpPr>
+          <p:cNvPr id="10" name="Rectangle 9">
+            <a:extLst>
+              <a:ext uri="{FF2B5EF4-FFF2-40B4-BE49-F238E27FC236}">
+                <a16:creationId xmlns:a16="http://schemas.microsoft.com/office/drawing/2014/main" id="{BBF4FF87-C62B-D95A-CB57-4F39CFB79749}"/>
+              </a:ext>
+            </a:extLst>
+          </p:cNvPr>
+          <p:cNvSpPr/>
+          <p:nvPr/>
+        </p:nvSpPr>
+        <p:spPr>
+          <a:xfrm>
+            <a:off x="6002662" y="3740197"/>
+            <a:ext cx="893379" cy="893379"/>
+          </a:xfrm>
+          <a:prstGeom prst="rect">
+            <a:avLst/>
+          </a:prstGeom>
+          <a:noFill/>
+          <a:ln w="28575">
+            <a:solidFill>
+              <a:schemeClr val="tx1"/>
+            </a:solidFill>
+          </a:ln>
+        </p:spPr>
+        <p:style>
+          <a:lnRef idx="2">
+            <a:schemeClr val="accent1">
+              <a:shade val="15000"/>
+            </a:schemeClr>
+          </a:lnRef>
+          <a:fillRef idx="1">
+            <a:schemeClr val="accent1"/>
+          </a:fillRef>
+          <a:effectRef idx="0">
+            <a:schemeClr val="accent1"/>
+          </a:effectRef>
+          <a:fontRef idx="minor">
+            <a:schemeClr val="lt1"/>
+          </a:fontRef>
+        </p:style>
+        <p:txBody>
+          <a:bodyPr rtlCol="0" anchor="ctr"/>
+          <a:lstStyle/>
+          <a:p>
+            <a:pPr algn="ctr"/>
+            <a:r>
+              <a:rPr lang="en-KW" sz="3200" dirty="0">
+                <a:solidFill>
+                  <a:srgbClr val="FF0000"/>
+                </a:solidFill>
+              </a:rPr>
+              <a:t>6</a:t>
+            </a:r>
+          </a:p>
+          <a:p>
+            <a:pPr marL="0" marR="0" lvl="0" indent="0" algn="ctr" defTabSz="914400" rtl="0" eaLnBrk="1" fontAlgn="auto" latinLnBrk="0" hangingPunct="1">
+              <a:lnSpc>
+                <a:spcPct val="100000"/>
+              </a:lnSpc>
+              <a:spcBef>
+                <a:spcPts val="0"/>
+              </a:spcBef>
+              <a:spcAft>
+                <a:spcPts val="0"/>
+              </a:spcAft>
+              <a:buClrTx/>
+              <a:buSzTx/>
+              <a:buFontTx/>
+              <a:buNone/>
+              <a:tabLst/>
+              <a:defRPr/>
+            </a:pPr>
+            <a:r>
+              <a:rPr kumimoji="0" lang="en-KW" sz="1600" b="0" i="0" u="none" strike="noStrike" kern="1200" cap="none" spc="0" normalizeH="0" baseline="0" noProof="0" dirty="0">
+                <a:ln>
+                  <a:noFill/>
+                </a:ln>
+                <a:solidFill>
+                  <a:srgbClr val="FF0000"/>
+                </a:solidFill>
+                <a:effectLst/>
+                <a:uLnTx/>
+                <a:uFillTx/>
+                <a:latin typeface="Aptos" panose="02110004020202020204"/>
+                <a:ea typeface="+mn-ea"/>
+                <a:cs typeface="+mn-cs"/>
+              </a:rPr>
+              <a:t>(1,2)</a:t>
+            </a:r>
+          </a:p>
+        </p:txBody>
+      </p:sp>
+      <p:sp>
+        <p:nvSpPr>
+          <p:cNvPr id="11" name="Rectangle 10">
+            <a:extLst>
+              <a:ext uri="{FF2B5EF4-FFF2-40B4-BE49-F238E27FC236}">
+                <a16:creationId xmlns:a16="http://schemas.microsoft.com/office/drawing/2014/main" id="{B980C287-DC42-A90B-01AE-3BEB2B48DF55}"/>
+              </a:ext>
+            </a:extLst>
+          </p:cNvPr>
+          <p:cNvSpPr/>
+          <p:nvPr/>
+        </p:nvSpPr>
+        <p:spPr>
+          <a:xfrm>
+            <a:off x="6896041" y="3740196"/>
+            <a:ext cx="893379" cy="893379"/>
+          </a:xfrm>
+          <a:prstGeom prst="rect">
+            <a:avLst/>
+          </a:prstGeom>
+          <a:noFill/>
+          <a:ln w="28575">
+            <a:solidFill>
+              <a:schemeClr val="tx1"/>
+            </a:solidFill>
+          </a:ln>
+        </p:spPr>
+        <p:style>
+          <a:lnRef idx="2">
+            <a:schemeClr val="accent1">
+              <a:shade val="15000"/>
+            </a:schemeClr>
+          </a:lnRef>
+          <a:fillRef idx="1">
+            <a:schemeClr val="accent1"/>
+          </a:fillRef>
+          <a:effectRef idx="0">
+            <a:schemeClr val="accent1"/>
+          </a:effectRef>
+          <a:fontRef idx="minor">
+            <a:schemeClr val="lt1"/>
+          </a:fontRef>
+        </p:style>
+        <p:txBody>
+          <a:bodyPr rtlCol="0" anchor="ctr"/>
+          <a:lstStyle/>
+          <a:p>
+            <a:pPr algn="ctr"/>
+            <a:r>
+              <a:rPr lang="en-KW" sz="3200" dirty="0">
+                <a:solidFill>
+                  <a:srgbClr val="FF0000"/>
+                </a:solidFill>
+              </a:rPr>
+              <a:t>7</a:t>
+            </a:r>
+          </a:p>
+          <a:p>
+            <a:pPr marL="0" marR="0" lvl="0" indent="0" algn="ctr" defTabSz="914400" rtl="0" eaLnBrk="1" fontAlgn="auto" latinLnBrk="0" hangingPunct="1">
+              <a:lnSpc>
+                <a:spcPct val="100000"/>
+              </a:lnSpc>
+              <a:spcBef>
+                <a:spcPts val="0"/>
+              </a:spcBef>
+              <a:spcAft>
+                <a:spcPts val="0"/>
+              </a:spcAft>
+              <a:buClrTx/>
+              <a:buSzTx/>
+              <a:buFontTx/>
+              <a:buNone/>
+              <a:tabLst/>
+              <a:defRPr/>
+            </a:pPr>
+            <a:r>
+              <a:rPr kumimoji="0" lang="en-KW" sz="1600" b="0" i="0" u="none" strike="noStrike" kern="1200" cap="none" spc="0" normalizeH="0" baseline="0" noProof="0" dirty="0">
+                <a:ln>
+                  <a:noFill/>
+                </a:ln>
+                <a:solidFill>
+                  <a:srgbClr val="FF0000"/>
+                </a:solidFill>
+                <a:effectLst/>
+                <a:uLnTx/>
+                <a:uFillTx/>
+                <a:latin typeface="Aptos" panose="02110004020202020204"/>
+                <a:ea typeface="+mn-ea"/>
+                <a:cs typeface="+mn-cs"/>
+              </a:rPr>
+              <a:t>(1,3)</a:t>
+            </a:r>
+          </a:p>
+        </p:txBody>
+      </p:sp>
+      <p:sp>
+        <p:nvSpPr>
+          <p:cNvPr id="12" name="Rectangle 11">
+            <a:extLst>
+              <a:ext uri="{FF2B5EF4-FFF2-40B4-BE49-F238E27FC236}">
+                <a16:creationId xmlns:a16="http://schemas.microsoft.com/office/drawing/2014/main" id="{8811BACA-9456-AA32-B6E0-E76A3729D488}"/>
+              </a:ext>
+            </a:extLst>
+          </p:cNvPr>
+          <p:cNvSpPr/>
+          <p:nvPr/>
+        </p:nvSpPr>
+        <p:spPr>
+          <a:xfrm>
+            <a:off x="4215904" y="4633575"/>
+            <a:ext cx="893379" cy="893379"/>
+          </a:xfrm>
+          <a:prstGeom prst="rect">
+            <a:avLst/>
+          </a:prstGeom>
+          <a:noFill/>
+          <a:ln w="28575">
+            <a:solidFill>
+              <a:schemeClr val="tx1"/>
+            </a:solidFill>
+          </a:ln>
+        </p:spPr>
+        <p:style>
+          <a:lnRef idx="2">
+            <a:schemeClr val="accent1">
+              <a:shade val="15000"/>
+            </a:schemeClr>
+          </a:lnRef>
+          <a:fillRef idx="1">
+            <a:schemeClr val="accent1"/>
+          </a:fillRef>
+          <a:effectRef idx="0">
+            <a:schemeClr val="accent1"/>
+          </a:effectRef>
+          <a:fontRef idx="minor">
+            <a:schemeClr val="lt1"/>
+          </a:fontRef>
+        </p:style>
+        <p:txBody>
+          <a:bodyPr rtlCol="0" anchor="ctr"/>
+          <a:lstStyle/>
+          <a:p>
+            <a:pPr algn="ctr"/>
+            <a:r>
+              <a:rPr lang="en-KW" sz="3200" dirty="0">
+                <a:solidFill>
+                  <a:srgbClr val="FF0000"/>
+                </a:solidFill>
+              </a:rPr>
+              <a:t>8</a:t>
+            </a:r>
+          </a:p>
+          <a:p>
+            <a:pPr marL="0" marR="0" lvl="0" indent="0" algn="ctr" defTabSz="914400" rtl="0" eaLnBrk="1" fontAlgn="auto" latinLnBrk="0" hangingPunct="1">
+              <a:lnSpc>
+                <a:spcPct val="100000"/>
+              </a:lnSpc>
+              <a:spcBef>
+                <a:spcPts val="0"/>
+              </a:spcBef>
+              <a:spcAft>
+                <a:spcPts val="0"/>
+              </a:spcAft>
+              <a:buClrTx/>
+              <a:buSzTx/>
+              <a:buFontTx/>
+              <a:buNone/>
+              <a:tabLst/>
+              <a:defRPr/>
+            </a:pPr>
+            <a:r>
+              <a:rPr kumimoji="0" lang="en-KW" sz="1600" b="0" i="0" u="none" strike="noStrike" kern="1200" cap="none" spc="0" normalizeH="0" baseline="0" noProof="0" dirty="0">
+                <a:ln>
+                  <a:noFill/>
+                </a:ln>
+                <a:solidFill>
+                  <a:srgbClr val="FF0000"/>
+                </a:solidFill>
+                <a:effectLst/>
+                <a:uLnTx/>
+                <a:uFillTx/>
+                <a:latin typeface="Aptos" panose="02110004020202020204"/>
+                <a:ea typeface="+mn-ea"/>
+                <a:cs typeface="+mn-cs"/>
+              </a:rPr>
+              <a:t>(2,0)</a:t>
+            </a:r>
+          </a:p>
+        </p:txBody>
+      </p:sp>
+      <p:sp>
+        <p:nvSpPr>
+          <p:cNvPr id="13" name="Rectangle 12">
+            <a:extLst>
+              <a:ext uri="{FF2B5EF4-FFF2-40B4-BE49-F238E27FC236}">
+                <a16:creationId xmlns:a16="http://schemas.microsoft.com/office/drawing/2014/main" id="{5E9EF780-2369-E979-4486-B65E1FAAE621}"/>
+              </a:ext>
+            </a:extLst>
+          </p:cNvPr>
+          <p:cNvSpPr/>
+          <p:nvPr/>
+        </p:nvSpPr>
+        <p:spPr>
+          <a:xfrm>
+            <a:off x="5109283" y="4633575"/>
+            <a:ext cx="893379" cy="893379"/>
+          </a:xfrm>
+          <a:prstGeom prst="rect">
+            <a:avLst/>
+          </a:prstGeom>
+          <a:noFill/>
+          <a:ln w="28575">
+            <a:solidFill>
+              <a:schemeClr val="tx1"/>
+            </a:solidFill>
+          </a:ln>
+        </p:spPr>
+        <p:style>
+          <a:lnRef idx="2">
+            <a:schemeClr val="accent1">
+              <a:shade val="15000"/>
+            </a:schemeClr>
+          </a:lnRef>
+          <a:fillRef idx="1">
+            <a:schemeClr val="accent1"/>
+          </a:fillRef>
+          <a:effectRef idx="0">
+            <a:schemeClr val="accent1"/>
+          </a:effectRef>
+          <a:fontRef idx="minor">
+            <a:schemeClr val="lt1"/>
+          </a:fontRef>
+        </p:style>
+        <p:txBody>
+          <a:bodyPr rtlCol="0" anchor="ctr"/>
+          <a:lstStyle/>
+          <a:p>
+            <a:pPr algn="ctr"/>
+            <a:r>
+              <a:rPr lang="en-KW" sz="3200" dirty="0">
+                <a:solidFill>
+                  <a:srgbClr val="FF0000"/>
+                </a:solidFill>
+              </a:rPr>
+              <a:t>9</a:t>
+            </a:r>
+          </a:p>
+          <a:p>
+            <a:pPr marL="0" marR="0" lvl="0" indent="0" algn="ctr" defTabSz="914400" rtl="0" eaLnBrk="1" fontAlgn="auto" latinLnBrk="0" hangingPunct="1">
+              <a:lnSpc>
+                <a:spcPct val="100000"/>
+              </a:lnSpc>
+              <a:spcBef>
+                <a:spcPts val="0"/>
+              </a:spcBef>
+              <a:spcAft>
+                <a:spcPts val="0"/>
+              </a:spcAft>
+              <a:buClrTx/>
+              <a:buSzTx/>
+              <a:buFontTx/>
+              <a:buNone/>
+              <a:tabLst/>
+              <a:defRPr/>
+            </a:pPr>
+            <a:r>
+              <a:rPr kumimoji="0" lang="en-KW" sz="1600" b="0" i="0" u="none" strike="noStrike" kern="1200" cap="none" spc="0" normalizeH="0" baseline="0" noProof="0" dirty="0">
+                <a:ln>
+                  <a:noFill/>
+                </a:ln>
+                <a:solidFill>
+                  <a:srgbClr val="FF0000"/>
+                </a:solidFill>
+                <a:effectLst/>
+                <a:uLnTx/>
+                <a:uFillTx/>
+                <a:latin typeface="Aptos" panose="02110004020202020204"/>
+                <a:ea typeface="+mn-ea"/>
+                <a:cs typeface="+mn-cs"/>
+              </a:rPr>
+              <a:t>(2,1)</a:t>
+            </a:r>
+          </a:p>
+        </p:txBody>
+      </p:sp>
+      <p:sp>
+        <p:nvSpPr>
+          <p:cNvPr id="14" name="Rectangle 13">
+            <a:extLst>
+              <a:ext uri="{FF2B5EF4-FFF2-40B4-BE49-F238E27FC236}">
+                <a16:creationId xmlns:a16="http://schemas.microsoft.com/office/drawing/2014/main" id="{C3EEBE22-855E-21D1-F0CD-4F6BF06E64BC}"/>
+              </a:ext>
+            </a:extLst>
+          </p:cNvPr>
+          <p:cNvSpPr/>
+          <p:nvPr/>
+        </p:nvSpPr>
+        <p:spPr>
+          <a:xfrm>
+            <a:off x="6002662" y="4633574"/>
+            <a:ext cx="893379" cy="893379"/>
+          </a:xfrm>
+          <a:prstGeom prst="rect">
+            <a:avLst/>
+          </a:prstGeom>
+          <a:noFill/>
+          <a:ln w="28575">
+            <a:solidFill>
+              <a:schemeClr val="tx1"/>
+            </a:solidFill>
+          </a:ln>
+        </p:spPr>
+        <p:style>
+          <a:lnRef idx="2">
+            <a:schemeClr val="accent1">
+              <a:shade val="15000"/>
+            </a:schemeClr>
+          </a:lnRef>
+          <a:fillRef idx="1">
+            <a:schemeClr val="accent1"/>
+          </a:fillRef>
+          <a:effectRef idx="0">
+            <a:schemeClr val="accent1"/>
+          </a:effectRef>
+          <a:fontRef idx="minor">
+            <a:schemeClr val="lt1"/>
+          </a:fontRef>
+        </p:style>
+        <p:txBody>
+          <a:bodyPr rtlCol="0" anchor="ctr"/>
+          <a:lstStyle/>
+          <a:p>
+            <a:pPr algn="ctr"/>
+            <a:r>
+              <a:rPr lang="en-KW" sz="3200" dirty="0">
+                <a:solidFill>
+                  <a:srgbClr val="FF0000"/>
+                </a:solidFill>
+              </a:rPr>
+              <a:t>10</a:t>
+            </a:r>
+          </a:p>
+          <a:p>
+            <a:pPr marL="0" marR="0" lvl="0" indent="0" algn="ctr" defTabSz="914400" rtl="0" eaLnBrk="1" fontAlgn="auto" latinLnBrk="0" hangingPunct="1">
+              <a:lnSpc>
+                <a:spcPct val="100000"/>
+              </a:lnSpc>
+              <a:spcBef>
+                <a:spcPts val="0"/>
+              </a:spcBef>
+              <a:spcAft>
+                <a:spcPts val="0"/>
+              </a:spcAft>
+              <a:buClrTx/>
+              <a:buSzTx/>
+              <a:buFontTx/>
+              <a:buNone/>
+              <a:tabLst/>
+              <a:defRPr/>
+            </a:pPr>
+            <a:r>
+              <a:rPr kumimoji="0" lang="en-KW" sz="1600" b="0" i="0" u="none" strike="noStrike" kern="1200" cap="none" spc="0" normalizeH="0" baseline="0" noProof="0" dirty="0">
+                <a:ln>
+                  <a:noFill/>
+                </a:ln>
+                <a:solidFill>
+                  <a:srgbClr val="FF0000"/>
+                </a:solidFill>
+                <a:effectLst/>
+                <a:uLnTx/>
+                <a:uFillTx/>
+                <a:latin typeface="Aptos" panose="02110004020202020204"/>
+                <a:ea typeface="+mn-ea"/>
+                <a:cs typeface="+mn-cs"/>
+              </a:rPr>
+              <a:t>(2,2)</a:t>
+            </a:r>
+          </a:p>
+        </p:txBody>
+      </p:sp>
+      <p:sp>
+        <p:nvSpPr>
+          <p:cNvPr id="15" name="Rectangle 14">
+            <a:extLst>
+              <a:ext uri="{FF2B5EF4-FFF2-40B4-BE49-F238E27FC236}">
+                <a16:creationId xmlns:a16="http://schemas.microsoft.com/office/drawing/2014/main" id="{20C14EF0-30B9-2A5E-22D6-37A6717635EF}"/>
+              </a:ext>
+            </a:extLst>
+          </p:cNvPr>
+          <p:cNvSpPr/>
+          <p:nvPr/>
+        </p:nvSpPr>
+        <p:spPr>
+          <a:xfrm>
+            <a:off x="6896041" y="4633573"/>
+            <a:ext cx="893379" cy="893379"/>
+          </a:xfrm>
+          <a:prstGeom prst="rect">
+            <a:avLst/>
+          </a:prstGeom>
+          <a:noFill/>
+          <a:ln w="28575">
+            <a:solidFill>
+              <a:schemeClr val="tx1"/>
+            </a:solidFill>
+          </a:ln>
+        </p:spPr>
+        <p:style>
+          <a:lnRef idx="2">
+            <a:schemeClr val="accent1">
+              <a:shade val="15000"/>
+            </a:schemeClr>
+          </a:lnRef>
+          <a:fillRef idx="1">
+            <a:schemeClr val="accent1"/>
+          </a:fillRef>
+          <a:effectRef idx="0">
+            <a:schemeClr val="accent1"/>
+          </a:effectRef>
+          <a:fontRef idx="minor">
+            <a:schemeClr val="lt1"/>
+          </a:fontRef>
+        </p:style>
+        <p:txBody>
+          <a:bodyPr rtlCol="0" anchor="ctr"/>
+          <a:lstStyle/>
+          <a:p>
+            <a:pPr algn="ctr"/>
+            <a:r>
+              <a:rPr lang="en-KW" sz="3200" dirty="0">
+                <a:solidFill>
+                  <a:srgbClr val="FF0000"/>
+                </a:solidFill>
+              </a:rPr>
+              <a:t>11</a:t>
+            </a:r>
+          </a:p>
+          <a:p>
+            <a:pPr marL="0" marR="0" lvl="0" indent="0" algn="ctr" defTabSz="914400" rtl="0" eaLnBrk="1" fontAlgn="auto" latinLnBrk="0" hangingPunct="1">
+              <a:lnSpc>
+                <a:spcPct val="100000"/>
+              </a:lnSpc>
+              <a:spcBef>
+                <a:spcPts val="0"/>
+              </a:spcBef>
+              <a:spcAft>
+                <a:spcPts val="0"/>
+              </a:spcAft>
+              <a:buClrTx/>
+              <a:buSzTx/>
+              <a:buFontTx/>
+              <a:buNone/>
+              <a:tabLst/>
+              <a:defRPr/>
+            </a:pPr>
+            <a:r>
+              <a:rPr kumimoji="0" lang="en-KW" sz="1600" b="0" i="0" u="none" strike="noStrike" kern="1200" cap="none" spc="0" normalizeH="0" baseline="0" noProof="0" dirty="0">
+                <a:ln>
+                  <a:noFill/>
+                </a:ln>
+                <a:solidFill>
+                  <a:srgbClr val="FF0000"/>
+                </a:solidFill>
+                <a:effectLst/>
+                <a:uLnTx/>
+                <a:uFillTx/>
+                <a:latin typeface="Aptos" panose="02110004020202020204"/>
+                <a:ea typeface="+mn-ea"/>
+                <a:cs typeface="+mn-cs"/>
+              </a:rPr>
+              <a:t>(2,3)</a:t>
+            </a:r>
+          </a:p>
+        </p:txBody>
+      </p:sp>
+      <p:sp>
+        <p:nvSpPr>
+          <p:cNvPr id="16" name="Rectangle 15">
+            <a:extLst>
+              <a:ext uri="{FF2B5EF4-FFF2-40B4-BE49-F238E27FC236}">
+                <a16:creationId xmlns:a16="http://schemas.microsoft.com/office/drawing/2014/main" id="{96003FE9-2DED-B63C-0E1A-56D5596AE2F6}"/>
+              </a:ext>
+            </a:extLst>
+          </p:cNvPr>
+          <p:cNvSpPr/>
+          <p:nvPr/>
+        </p:nvSpPr>
+        <p:spPr>
+          <a:xfrm>
+            <a:off x="4215904" y="1953436"/>
+            <a:ext cx="893379" cy="893379"/>
+          </a:xfrm>
+          <a:prstGeom prst="rect">
+            <a:avLst/>
+          </a:prstGeom>
+          <a:noFill/>
+          <a:ln w="28575">
+            <a:noFill/>
+          </a:ln>
+        </p:spPr>
+        <p:style>
+          <a:lnRef idx="2">
+            <a:schemeClr val="accent1">
+              <a:shade val="15000"/>
+            </a:schemeClr>
+          </a:lnRef>
+          <a:fillRef idx="1">
+            <a:schemeClr val="accent1"/>
+          </a:fillRef>
+          <a:effectRef idx="0">
+            <a:schemeClr val="accent1"/>
+          </a:effectRef>
+          <a:fontRef idx="minor">
+            <a:schemeClr val="lt1"/>
+          </a:fontRef>
+        </p:style>
+        <p:txBody>
+          <a:bodyPr rtlCol="0" anchor="ctr"/>
+          <a:lstStyle/>
+          <a:p>
+            <a:pPr algn="ctr"/>
+            <a:r>
+              <a:rPr lang="en-KW" sz="3200" dirty="0">
+                <a:solidFill>
+                  <a:schemeClr val="tx1"/>
+                </a:solidFill>
+              </a:rPr>
+              <a:t>0</a:t>
+            </a:r>
+          </a:p>
+        </p:txBody>
+      </p:sp>
+      <p:sp>
+        <p:nvSpPr>
+          <p:cNvPr id="17" name="Rectangle 16">
+            <a:extLst>
+              <a:ext uri="{FF2B5EF4-FFF2-40B4-BE49-F238E27FC236}">
+                <a16:creationId xmlns:a16="http://schemas.microsoft.com/office/drawing/2014/main" id="{7CA16CB1-2915-3E29-7FAF-136B98CC9700}"/>
+              </a:ext>
+            </a:extLst>
+          </p:cNvPr>
+          <p:cNvSpPr/>
+          <p:nvPr/>
+        </p:nvSpPr>
+        <p:spPr>
+          <a:xfrm>
+            <a:off x="5109283" y="1953436"/>
+            <a:ext cx="893379" cy="893379"/>
+          </a:xfrm>
+          <a:prstGeom prst="rect">
+            <a:avLst/>
+          </a:prstGeom>
+          <a:noFill/>
+          <a:ln w="28575">
+            <a:noFill/>
+          </a:ln>
+        </p:spPr>
+        <p:style>
+          <a:lnRef idx="2">
+            <a:schemeClr val="accent1">
+              <a:shade val="15000"/>
+            </a:schemeClr>
+          </a:lnRef>
+          <a:fillRef idx="1">
+            <a:schemeClr val="accent1"/>
+          </a:fillRef>
+          <a:effectRef idx="0">
+            <a:schemeClr val="accent1"/>
+          </a:effectRef>
+          <a:fontRef idx="minor">
+            <a:schemeClr val="lt1"/>
+          </a:fontRef>
+        </p:style>
+        <p:txBody>
+          <a:bodyPr rtlCol="0" anchor="ctr"/>
+          <a:lstStyle/>
+          <a:p>
+            <a:pPr algn="ctr"/>
+            <a:r>
+              <a:rPr lang="en-KW" sz="3200" dirty="0">
+                <a:solidFill>
+                  <a:schemeClr val="tx1"/>
+                </a:solidFill>
+              </a:rPr>
+              <a:t>1</a:t>
+            </a:r>
+          </a:p>
+        </p:txBody>
+      </p:sp>
+      <p:sp>
+        <p:nvSpPr>
+          <p:cNvPr id="18" name="Rectangle 17">
+            <a:extLst>
+              <a:ext uri="{FF2B5EF4-FFF2-40B4-BE49-F238E27FC236}">
+                <a16:creationId xmlns:a16="http://schemas.microsoft.com/office/drawing/2014/main" id="{AD22DDA0-70EA-C3DE-F64D-2CC85742867B}"/>
+              </a:ext>
+            </a:extLst>
+          </p:cNvPr>
+          <p:cNvSpPr/>
+          <p:nvPr/>
+        </p:nvSpPr>
+        <p:spPr>
+          <a:xfrm>
+            <a:off x="6002662" y="1953435"/>
+            <a:ext cx="893379" cy="893379"/>
+          </a:xfrm>
+          <a:prstGeom prst="rect">
+            <a:avLst/>
+          </a:prstGeom>
+          <a:noFill/>
+          <a:ln w="28575">
+            <a:noFill/>
+          </a:ln>
+        </p:spPr>
+        <p:style>
+          <a:lnRef idx="2">
+            <a:schemeClr val="accent1">
+              <a:shade val="15000"/>
+            </a:schemeClr>
+          </a:lnRef>
+          <a:fillRef idx="1">
+            <a:schemeClr val="accent1"/>
+          </a:fillRef>
+          <a:effectRef idx="0">
+            <a:schemeClr val="accent1"/>
+          </a:effectRef>
+          <a:fontRef idx="minor">
+            <a:schemeClr val="lt1"/>
+          </a:fontRef>
+        </p:style>
+        <p:txBody>
+          <a:bodyPr rtlCol="0" anchor="ctr"/>
+          <a:lstStyle/>
+          <a:p>
+            <a:pPr algn="ctr"/>
+            <a:r>
+              <a:rPr lang="en-KW" sz="3200" dirty="0">
+                <a:solidFill>
+                  <a:schemeClr val="tx1"/>
+                </a:solidFill>
+              </a:rPr>
+              <a:t>2</a:t>
+            </a:r>
+          </a:p>
+        </p:txBody>
+      </p:sp>
+      <p:sp>
+        <p:nvSpPr>
+          <p:cNvPr id="19" name="Rectangle 18">
+            <a:extLst>
+              <a:ext uri="{FF2B5EF4-FFF2-40B4-BE49-F238E27FC236}">
+                <a16:creationId xmlns:a16="http://schemas.microsoft.com/office/drawing/2014/main" id="{301E4C16-E882-29DD-6955-D76F51A9B6B5}"/>
+              </a:ext>
+            </a:extLst>
+          </p:cNvPr>
+          <p:cNvSpPr/>
+          <p:nvPr/>
+        </p:nvSpPr>
+        <p:spPr>
+          <a:xfrm>
+            <a:off x="6896041" y="1953434"/>
+            <a:ext cx="893379" cy="893379"/>
+          </a:xfrm>
+          <a:prstGeom prst="rect">
+            <a:avLst/>
+          </a:prstGeom>
+          <a:noFill/>
+          <a:ln w="28575">
+            <a:noFill/>
+          </a:ln>
+        </p:spPr>
+        <p:style>
+          <a:lnRef idx="2">
+            <a:schemeClr val="accent1">
+              <a:shade val="15000"/>
+            </a:schemeClr>
+          </a:lnRef>
+          <a:fillRef idx="1">
+            <a:schemeClr val="accent1"/>
+          </a:fillRef>
+          <a:effectRef idx="0">
+            <a:schemeClr val="accent1"/>
+          </a:effectRef>
+          <a:fontRef idx="minor">
+            <a:schemeClr val="lt1"/>
+          </a:fontRef>
+        </p:style>
+        <p:txBody>
+          <a:bodyPr rtlCol="0" anchor="ctr"/>
+          <a:lstStyle/>
+          <a:p>
+            <a:pPr algn="ctr"/>
+            <a:r>
+              <a:rPr lang="en-KW" sz="3200" dirty="0">
+                <a:solidFill>
+                  <a:schemeClr val="tx1"/>
+                </a:solidFill>
+              </a:rPr>
+              <a:t>3</a:t>
+            </a:r>
+          </a:p>
+        </p:txBody>
+      </p:sp>
+      <p:sp>
+        <p:nvSpPr>
+          <p:cNvPr id="20" name="Rectangle 19">
+            <a:extLst>
+              <a:ext uri="{FF2B5EF4-FFF2-40B4-BE49-F238E27FC236}">
+                <a16:creationId xmlns:a16="http://schemas.microsoft.com/office/drawing/2014/main" id="{13DA530D-B26F-50C2-7F68-EB66F9B9AFA6}"/>
+              </a:ext>
+            </a:extLst>
+          </p:cNvPr>
+          <p:cNvSpPr/>
+          <p:nvPr/>
+        </p:nvSpPr>
+        <p:spPr>
+          <a:xfrm>
+            <a:off x="3322525" y="2846817"/>
+            <a:ext cx="893379" cy="893379"/>
+          </a:xfrm>
+          <a:prstGeom prst="rect">
+            <a:avLst/>
+          </a:prstGeom>
+          <a:noFill/>
+          <a:ln w="28575">
+            <a:noFill/>
+          </a:ln>
+        </p:spPr>
+        <p:style>
+          <a:lnRef idx="2">
+            <a:schemeClr val="accent1">
+              <a:shade val="15000"/>
+            </a:schemeClr>
+          </a:lnRef>
+          <a:fillRef idx="1">
+            <a:schemeClr val="accent1"/>
+          </a:fillRef>
+          <a:effectRef idx="0">
+            <a:schemeClr val="accent1"/>
+          </a:effectRef>
+          <a:fontRef idx="minor">
+            <a:schemeClr val="lt1"/>
+          </a:fontRef>
+        </p:style>
+        <p:txBody>
+          <a:bodyPr rtlCol="0" anchor="ctr"/>
+          <a:lstStyle/>
+          <a:p>
+            <a:pPr algn="ctr"/>
+            <a:r>
+              <a:rPr lang="en-KW" sz="3200" dirty="0">
+                <a:solidFill>
+                  <a:schemeClr val="tx1"/>
+                </a:solidFill>
+              </a:rPr>
+              <a:t>0</a:t>
+            </a:r>
+          </a:p>
+        </p:txBody>
+      </p:sp>
+      <p:sp>
+        <p:nvSpPr>
+          <p:cNvPr id="21" name="Rectangle 20">
+            <a:extLst>
+              <a:ext uri="{FF2B5EF4-FFF2-40B4-BE49-F238E27FC236}">
+                <a16:creationId xmlns:a16="http://schemas.microsoft.com/office/drawing/2014/main" id="{7BE285F6-19E9-A730-A246-E63A7EF96B6E}"/>
+              </a:ext>
+            </a:extLst>
+          </p:cNvPr>
+          <p:cNvSpPr/>
+          <p:nvPr/>
+        </p:nvSpPr>
+        <p:spPr>
+          <a:xfrm>
+            <a:off x="3322525" y="3740196"/>
+            <a:ext cx="893379" cy="893379"/>
+          </a:xfrm>
+          <a:prstGeom prst="rect">
+            <a:avLst/>
+          </a:prstGeom>
+          <a:noFill/>
+          <a:ln w="28575">
+            <a:noFill/>
+          </a:ln>
+        </p:spPr>
+        <p:style>
+          <a:lnRef idx="2">
+            <a:schemeClr val="accent1">
+              <a:shade val="15000"/>
+            </a:schemeClr>
+          </a:lnRef>
+          <a:fillRef idx="1">
+            <a:schemeClr val="accent1"/>
+          </a:fillRef>
+          <a:effectRef idx="0">
+            <a:schemeClr val="accent1"/>
+          </a:effectRef>
+          <a:fontRef idx="minor">
+            <a:schemeClr val="lt1"/>
+          </a:fontRef>
+        </p:style>
+        <p:txBody>
+          <a:bodyPr rtlCol="0" anchor="ctr"/>
+          <a:lstStyle/>
+          <a:p>
+            <a:pPr algn="ctr"/>
+            <a:r>
+              <a:rPr lang="en-KW" sz="3200" dirty="0">
+                <a:solidFill>
+                  <a:schemeClr val="tx1"/>
+                </a:solidFill>
+              </a:rPr>
+              <a:t>1</a:t>
+            </a:r>
+          </a:p>
+        </p:txBody>
+      </p:sp>
+      <p:sp>
+        <p:nvSpPr>
+          <p:cNvPr id="22" name="Rectangle 21">
+            <a:extLst>
+              <a:ext uri="{FF2B5EF4-FFF2-40B4-BE49-F238E27FC236}">
+                <a16:creationId xmlns:a16="http://schemas.microsoft.com/office/drawing/2014/main" id="{88579EE0-991D-08DF-3983-B620C359E2CB}"/>
+              </a:ext>
+            </a:extLst>
+          </p:cNvPr>
+          <p:cNvSpPr/>
+          <p:nvPr/>
+        </p:nvSpPr>
+        <p:spPr>
+          <a:xfrm>
+            <a:off x="3322525" y="4633573"/>
+            <a:ext cx="893379" cy="893379"/>
+          </a:xfrm>
+          <a:prstGeom prst="rect">
+            <a:avLst/>
+          </a:prstGeom>
+          <a:noFill/>
+          <a:ln w="28575">
+            <a:noFill/>
+          </a:ln>
+        </p:spPr>
+        <p:style>
+          <a:lnRef idx="2">
+            <a:schemeClr val="accent1">
+              <a:shade val="15000"/>
+            </a:schemeClr>
+          </a:lnRef>
+          <a:fillRef idx="1">
+            <a:schemeClr val="accent1"/>
+          </a:fillRef>
+          <a:effectRef idx="0">
+            <a:schemeClr val="accent1"/>
+          </a:effectRef>
+          <a:fontRef idx="minor">
+            <a:schemeClr val="lt1"/>
+          </a:fontRef>
+        </p:style>
+        <p:txBody>
+          <a:bodyPr rtlCol="0" anchor="ctr"/>
+          <a:lstStyle/>
+          <a:p>
+            <a:pPr algn="ctr"/>
+            <a:r>
+              <a:rPr lang="en-KW" sz="3200" dirty="0">
+                <a:solidFill>
+                  <a:schemeClr val="tx1"/>
+                </a:solidFill>
+              </a:rPr>
+              <a:t>2</a:t>
+            </a:r>
+          </a:p>
+        </p:txBody>
+      </p:sp>
+    </p:spTree>
+    <p:extLst>
+      <p:ext uri="{BB962C8B-B14F-4D97-AF65-F5344CB8AC3E}">
+        <p14:creationId xmlns:p14="http://schemas.microsoft.com/office/powerpoint/2010/main" val="2374266752"/>
       </p:ext>
     </p:extLst>
   </p:cSld>

</xml_diff>